<commit_message>
improved pptx, final changes
</commit_message>
<xml_diff>
--- a/pptx/maniserowicz-git.pptx
+++ b/pptx/maniserowicz-git.pptx
@@ -228,7 +228,7 @@
             <a:fld id="{2810F460-E5BA-41E1-BC6D-0AF245B492C5}" type="datetimeFigureOut">
               <a:rPr lang="pl-PL" smtClean="0"/>
               <a:pPr/>
-              <a:t>2012-03-25</a:t>
+              <a:t>2012-03-26</a:t>
             </a:fld>
             <a:endParaRPr lang="pl-PL"/>
           </a:p>
@@ -706,7 +706,6 @@
               <a:rPr lang="pl-PL" baseline="0" dirty="0" smtClean="0"/>
               <a:t>git clone git://github.com/maniserowicz/msmvppl.git</a:t>
             </a:r>
-            <a:endParaRPr lang="pl-PL" baseline="0" dirty="0" smtClean="0"/>
           </a:p>
         </p:txBody>
       </p:sp>
@@ -994,7 +993,6 @@
               <a:rPr lang="pl-PL" baseline="0" dirty="0" smtClean="0"/>
               <a:t>git submodule update</a:t>
             </a:r>
-            <a:endParaRPr lang="pl-PL" baseline="0" dirty="0" smtClean="0"/>
           </a:p>
         </p:txBody>
       </p:sp>
@@ -1270,7 +1268,7 @@
             </a:pPr>
             <a:r>
               <a:rPr lang="pl-PL" baseline="0" dirty="0" smtClean="0"/>
-              <a:t>[modyfikacja plików w VS]</a:t>
+              <a:t>[modyfikacja plików w VS - dodanie sekcji na stronie głównej]</a:t>
             </a:r>
           </a:p>
           <a:p>
@@ -1300,7 +1298,7 @@
             </a:pPr>
             <a:r>
               <a:rPr lang="pl-PL" baseline="0" dirty="0" smtClean="0"/>
-              <a:t>[modyfikacja większej liczby plików]</a:t>
+              <a:t>[modyfikacja większej liczby plików - dodanie linka z nowej sekcji do nowej strony]</a:t>
             </a:r>
           </a:p>
           <a:p>
@@ -1595,7 +1593,7 @@
             </a:pPr>
             <a:r>
               <a:rPr lang="pl-PL" baseline="0" dirty="0" smtClean="0"/>
-              <a:t>git commit --amend</a:t>
+              <a:t>modyfikacja nowego cshmtl...</a:t>
             </a:r>
           </a:p>
           <a:p>
@@ -1605,7 +1603,7 @@
             </a:pPr>
             <a:r>
               <a:rPr lang="pl-PL" baseline="0" dirty="0" smtClean="0"/>
-              <a:t>modyfikacje (commity) w 2 gałęziach</a:t>
+              <a:t>git commit --amend</a:t>
             </a:r>
           </a:p>
           <a:p>
@@ -1615,7 +1613,7 @@
             </a:pPr>
             <a:r>
               <a:rPr lang="pl-PL" baseline="0" dirty="0" smtClean="0"/>
-              <a:t>git rebase</a:t>
+              <a:t>git checkout master</a:t>
             </a:r>
           </a:p>
           <a:p>
@@ -1625,7 +1623,7 @@
             </a:pPr>
             <a:r>
               <a:rPr lang="pl-PL" baseline="0" dirty="0" smtClean="0"/>
-              <a:t>git rebase –i head~3</a:t>
+              <a:t>nowy commit</a:t>
             </a:r>
           </a:p>
           <a:p>
@@ -1633,14 +1631,30 @@
               <a:buFont typeface="Arial" charset="0"/>
               <a:buChar char="•"/>
             </a:pPr>
-            <a:endParaRPr lang="pl-PL" baseline="0" dirty="0" smtClean="0"/>
+            <a:r>
+              <a:rPr lang="pl-PL" baseline="0" dirty="0" smtClean="0"/>
+              <a:t>git checkout new-feature</a:t>
+            </a:r>
           </a:p>
           <a:p>
             <a:pPr marL="171450" indent="-171450">
               <a:buFont typeface="Arial" charset="0"/>
               <a:buChar char="•"/>
             </a:pPr>
-            <a:endParaRPr lang="pl-PL" baseline="0" dirty="0" smtClean="0"/>
+            <a:r>
+              <a:rPr lang="pl-PL" baseline="0" dirty="0" smtClean="0"/>
+              <a:t>git rebase master</a:t>
+            </a:r>
+          </a:p>
+          <a:p>
+            <a:pPr marL="171450" indent="-171450">
+              <a:buFont typeface="Arial" charset="0"/>
+              <a:buChar char="•"/>
+            </a:pPr>
+            <a:r>
+              <a:rPr lang="pl-PL" baseline="0" dirty="0" smtClean="0"/>
+              <a:t>git rebase –i head~4</a:t>
+            </a:r>
           </a:p>
         </p:txBody>
       </p:sp>
@@ -3179,7 +3193,7 @@
             <a:fld id="{9B79DAB6-A671-4DE4-9E38-0C6421F3422E}" type="datetimeFigureOut">
               <a:rPr lang="pl-PL" smtClean="0"/>
               <a:pPr/>
-              <a:t>2012-03-25</a:t>
+              <a:t>2012-03-26</a:t>
             </a:fld>
             <a:endParaRPr lang="pl-PL"/>
           </a:p>
@@ -3404,7 +3418,7 @@
             <a:fld id="{9B79DAB6-A671-4DE4-9E38-0C6421F3422E}" type="datetimeFigureOut">
               <a:rPr lang="pl-PL" smtClean="0"/>
               <a:pPr/>
-              <a:t>2012-03-25</a:t>
+              <a:t>2012-03-26</a:t>
             </a:fld>
             <a:endParaRPr lang="pl-PL"/>
           </a:p>
@@ -3686,7 +3700,7 @@
             <a:fld id="{9B79DAB6-A671-4DE4-9E38-0C6421F3422E}" type="datetimeFigureOut">
               <a:rPr lang="pl-PL" smtClean="0"/>
               <a:pPr/>
-              <a:t>2012-03-25</a:t>
+              <a:t>2012-03-26</a:t>
             </a:fld>
             <a:endParaRPr lang="pl-PL"/>
           </a:p>
@@ -3867,7 +3881,7 @@
             <a:fld id="{9B79DAB6-A671-4DE4-9E38-0C6421F3422E}" type="datetimeFigureOut">
               <a:rPr lang="pl-PL" smtClean="0"/>
               <a:pPr/>
-              <a:t>2012-03-25</a:t>
+              <a:t>2012-03-26</a:t>
             </a:fld>
             <a:endParaRPr lang="pl-PL"/>
           </a:p>
@@ -4227,7 +4241,7 @@
             <a:fld id="{9B79DAB6-A671-4DE4-9E38-0C6421F3422E}" type="datetimeFigureOut">
               <a:rPr lang="pl-PL" smtClean="0"/>
               <a:pPr/>
-              <a:t>2012-03-25</a:t>
+              <a:t>2012-03-26</a:t>
             </a:fld>
             <a:endParaRPr lang="pl-PL"/>
           </a:p>
@@ -4516,7 +4530,7 @@
             <a:fld id="{9B79DAB6-A671-4DE4-9E38-0C6421F3422E}" type="datetimeFigureOut">
               <a:rPr lang="pl-PL" smtClean="0"/>
               <a:pPr/>
-              <a:t>2012-03-25</a:t>
+              <a:t>2012-03-26</a:t>
             </a:fld>
             <a:endParaRPr lang="pl-PL"/>
           </a:p>
@@ -4940,7 +4954,7 @@
             <a:fld id="{9B79DAB6-A671-4DE4-9E38-0C6421F3422E}" type="datetimeFigureOut">
               <a:rPr lang="pl-PL" smtClean="0"/>
               <a:pPr/>
-              <a:t>2012-03-25</a:t>
+              <a:t>2012-03-26</a:t>
             </a:fld>
             <a:endParaRPr lang="pl-PL"/>
           </a:p>
@@ -5057,7 +5071,7 @@
             <a:fld id="{9B79DAB6-A671-4DE4-9E38-0C6421F3422E}" type="datetimeFigureOut">
               <a:rPr lang="pl-PL" smtClean="0"/>
               <a:pPr/>
-              <a:t>2012-03-25</a:t>
+              <a:t>2012-03-26</a:t>
             </a:fld>
             <a:endParaRPr lang="pl-PL"/>
           </a:p>
@@ -5149,7 +5163,7 @@
             <a:fld id="{9B79DAB6-A671-4DE4-9E38-0C6421F3422E}" type="datetimeFigureOut">
               <a:rPr lang="pl-PL" smtClean="0"/>
               <a:pPr/>
-              <a:t>2012-03-25</a:t>
+              <a:t>2012-03-26</a:t>
             </a:fld>
             <a:endParaRPr lang="pl-PL"/>
           </a:p>
@@ -5429,7 +5443,7 @@
             <a:fld id="{9B79DAB6-A671-4DE4-9E38-0C6421F3422E}" type="datetimeFigureOut">
               <a:rPr lang="pl-PL" smtClean="0"/>
               <a:pPr/>
-              <a:t>2012-03-25</a:t>
+              <a:t>2012-03-26</a:t>
             </a:fld>
             <a:endParaRPr lang="pl-PL"/>
           </a:p>
@@ -5797,7 +5811,7 @@
             <a:fld id="{9B79DAB6-A671-4DE4-9E38-0C6421F3422E}" type="datetimeFigureOut">
               <a:rPr lang="pl-PL" smtClean="0"/>
               <a:pPr/>
-              <a:t>2012-03-25</a:t>
+              <a:t>2012-03-26</a:t>
             </a:fld>
             <a:endParaRPr lang="pl-PL"/>
           </a:p>
@@ -6236,7 +6250,7 @@
             <a:fld id="{9B79DAB6-A671-4DE4-9E38-0C6421F3422E}" type="datetimeFigureOut">
               <a:rPr lang="pl-PL" smtClean="0"/>
               <a:pPr/>
-              <a:t>2012-03-25</a:t>
+              <a:t>2012-03-26</a:t>
             </a:fld>
             <a:endParaRPr lang="pl-PL"/>
           </a:p>
@@ -6769,9 +6783,14 @@
           <a:lstStyle/>
           <a:p>
             <a:r>
-              <a:rPr lang="pl-PL" dirty="0"/>
-              <a:t>praca offline (nawet gdy w firmie awaria internetu)</a:t>
-            </a:r>
+              <a:rPr lang="pl-PL"/>
+              <a:t>praca </a:t>
+            </a:r>
+            <a:r>
+              <a:rPr lang="pl-PL" smtClean="0"/>
+              <a:t>offline</a:t>
+            </a:r>
+            <a:endParaRPr lang="pl-PL" dirty="0"/>
           </a:p>
           <a:p>
             <a:pPr lvl="1"/>
@@ -7220,8 +7239,28 @@
             </a:r>
             <a:r>
               <a:rPr lang="pl-PL" dirty="0"/>
-              <a:t>– sciągnięcie zmian ze zdalnego repo</a:t>
-            </a:r>
+              <a:t>– sciągnięcie zmian ze zdalnego </a:t>
+            </a:r>
+            <a:r>
+              <a:rPr lang="pl-PL" dirty="0" smtClean="0"/>
+              <a:t>repo</a:t>
+            </a:r>
+          </a:p>
+          <a:p>
+            <a:pPr lvl="1"/>
+            <a:r>
+              <a:rPr lang="pl-PL" dirty="0" smtClean="0"/>
+              <a:t>= fetch </a:t>
+            </a:r>
+            <a:r>
+              <a:rPr lang="pl-PL" dirty="0"/>
+              <a:t>+ </a:t>
+            </a:r>
+            <a:r>
+              <a:rPr lang="pl-PL" dirty="0" smtClean="0"/>
+              <a:t>merge</a:t>
+            </a:r>
+            <a:endParaRPr lang="pl-PL" dirty="0"/>
           </a:p>
           <a:p>
             <a:r>
@@ -7232,14 +7271,6 @@
               <a:rPr lang="pl-PL" dirty="0" smtClean="0"/>
               <a:t>repo</a:t>
             </a:r>
-          </a:p>
-          <a:p>
-            <a:pPr lvl="1"/>
-            <a:r>
-              <a:rPr lang="pl-PL" dirty="0" smtClean="0"/>
-              <a:t>= fetch + merge</a:t>
-            </a:r>
-            <a:endParaRPr lang="pl-PL" dirty="0"/>
           </a:p>
         </p:txBody>
       </p:sp>
@@ -7306,11 +7337,7 @@
             </a:br>
             <a:r>
               <a:rPr lang="pl-PL" dirty="0" smtClean="0"/>
-              <a:t>l</a:t>
-            </a:r>
-            <a:r>
-              <a:rPr lang="pl-PL" dirty="0" smtClean="0"/>
-              <a:t>okalne repozytorium</a:t>
+              <a:t>lokalne repozytorium</a:t>
             </a:r>
             <a:endParaRPr lang="pl-PL" dirty="0"/>
           </a:p>
@@ -7352,7 +7379,7 @@
           <a:p>
             <a:r>
               <a:rPr lang="pl-PL" dirty="0" smtClean="0"/>
-              <a:t>checkout – zmiana working copy</a:t>
+              <a:t>checkout – zmiana wersji working copy</a:t>
             </a:r>
           </a:p>
           <a:p>
@@ -8781,9 +8808,8 @@
             <a:pPr lvl="1"/>
             <a:r>
               <a:rPr lang="pl-PL" dirty="0" smtClean="0"/>
-              <a:t>uwolnienie programistów kontroli wersji TFS</a:t>
-            </a:r>
-            <a:endParaRPr lang="pl-PL" dirty="0" smtClean="0"/>
+              <a:t>uwolnienie dev od mąk kontroli wersji w TFS</a:t>
+            </a:r>
           </a:p>
         </p:txBody>
       </p:sp>
@@ -8875,8 +8901,8 @@
           </a:p>
           <a:p>
             <a:r>
-              <a:rPr lang="pl-PL" dirty="0" smtClean="0"/>
-              <a:t>...choć polecam każdemu</a:t>
+              <a:rPr lang="pl-PL" smtClean="0"/>
+              <a:t>...choć największe korzyści jeśli wszyscy używają</a:t>
             </a:r>
             <a:endParaRPr lang="pl-PL" dirty="0" smtClean="0"/>
           </a:p>
@@ -9466,7 +9492,6 @@
               <a:rPr lang="pl-PL" dirty="0" smtClean="0"/>
               <a:t>publiczne i prywatne - darmowe</a:t>
             </a:r>
-            <a:endParaRPr lang="pl-PL" dirty="0" smtClean="0"/>
           </a:p>
           <a:p>
             <a:r>
@@ -9795,7 +9820,6 @@
               <a:rPr lang="pl-PL" dirty="0" smtClean="0"/>
               <a:t>Git w TFS</a:t>
             </a:r>
-            <a:endParaRPr lang="pl-PL" dirty="0" smtClean="0"/>
           </a:p>
         </p:txBody>
       </p:sp>
@@ -10065,11 +10089,7 @@
           <a:p>
             <a:r>
               <a:rPr lang="pl-PL" dirty="0" smtClean="0"/>
-              <a:t>Meine </a:t>
-            </a:r>
-            <a:r>
-              <a:rPr lang="pl-PL" dirty="0" smtClean="0"/>
-              <a:t>Blog</a:t>
+              <a:t>Meine Blog</a:t>
             </a:r>
           </a:p>
           <a:p>
@@ -10394,69 +10414,32 @@
           <a:p>
             <a:r>
               <a:rPr lang="pl-PL" dirty="0" smtClean="0"/>
-              <a:t>2007 </a:t>
-            </a:r>
-            <a:r>
-              <a:rPr lang="pl-PL" dirty="0" smtClean="0"/>
-              <a:t>– 2009 (studia i 3 etaty)</a:t>
-            </a:r>
-            <a:endParaRPr lang="pl-PL" dirty="0" smtClean="0"/>
+              <a:t>2007 – 2009 (studia i 3 etaty)</a:t>
+            </a:r>
           </a:p>
           <a:p>
             <a:pPr lvl="1"/>
             <a:r>
               <a:rPr lang="pl-PL" dirty="0" smtClean="0"/>
-              <a:t>TFS </a:t>
+              <a:t>TFS-&gt;SVN-&gt;TFS-&gt;SVN</a:t>
+            </a:r>
+            <a:endParaRPr lang="pl-PL" dirty="0"/>
+          </a:p>
+          <a:p>
+            <a:r>
+              <a:rPr lang="pl-PL" dirty="0" smtClean="0"/>
+              <a:t>2009 – 2012 (freelance, praca)</a:t>
+            </a:r>
+          </a:p>
+          <a:p>
+            <a:pPr lvl="1"/>
+            <a:r>
+              <a:rPr lang="pl-PL" dirty="0" smtClean="0"/>
+              <a:t>SVN-&gt;Git-&gt;Mercurial (HG)-&gt;Git-&gt;HG-&gt;TFS-</a:t>
             </a:r>
             <a:r>
               <a:rPr lang="pl-PL" dirty="0"/>
-              <a:t>-&gt; </a:t>
-            </a:r>
-            <a:r>
-              <a:rPr lang="pl-PL" dirty="0" smtClean="0"/>
-              <a:t>SVN </a:t>
-            </a:r>
-            <a:r>
-              <a:rPr lang="pl-PL" dirty="0"/>
-              <a:t>-&gt; </a:t>
-            </a:r>
-            <a:r>
-              <a:rPr lang="pl-PL" dirty="0" smtClean="0"/>
-              <a:t>TFS </a:t>
-            </a:r>
-            <a:r>
-              <a:rPr lang="pl-PL" dirty="0"/>
-              <a:t>-&gt; SVN</a:t>
-            </a:r>
-          </a:p>
-          <a:p>
-            <a:r>
-              <a:rPr lang="pl-PL" dirty="0" smtClean="0"/>
-              <a:t>2009 </a:t>
-            </a:r>
-            <a:r>
-              <a:rPr lang="pl-PL" dirty="0" smtClean="0"/>
-              <a:t>– 2012 (freelance, praca)</a:t>
-            </a:r>
-            <a:endParaRPr lang="pl-PL" dirty="0" smtClean="0"/>
-          </a:p>
-          <a:p>
-            <a:pPr lvl="1"/>
-            <a:r>
-              <a:rPr lang="pl-PL" dirty="0" smtClean="0"/>
-              <a:t>SVN </a:t>
-            </a:r>
-            <a:r>
-              <a:rPr lang="pl-PL" dirty="0"/>
-              <a:t>-&gt; Git -&gt; </a:t>
-            </a:r>
-            <a:r>
-              <a:rPr lang="pl-PL" dirty="0" smtClean="0"/>
-              <a:t>HG (Mercurial) </a:t>
-            </a:r>
-            <a:r>
-              <a:rPr lang="pl-PL" dirty="0"/>
-              <a:t>-&gt; Git -&gt; TFS -&gt; Git</a:t>
+              <a:t>&gt; Git</a:t>
             </a:r>
           </a:p>
           <a:p>

</xml_diff>